<commit_message>
revisi gambar flowchart, modif slide
</commit_message>
<xml_diff>
--- a/Presentasi Implementasi VoG - Perancangan Sistem.pptx
+++ b/Presentasi Implementasi VoG - Perancangan Sistem.pptx
@@ -9,7 +9,8 @@
     <p:sldId id="260" r:id="rId3"/>
     <p:sldId id="261" r:id="rId4"/>
     <p:sldId id="258" r:id="rId5"/>
-    <p:sldId id="259" r:id="rId6"/>
+    <p:sldId id="262" r:id="rId6"/>
+    <p:sldId id="259" r:id="rId7"/>
   </p:sldIdLst>
   <p:sldSz cx="12192000" cy="6858000"/>
   <p:notesSz cx="6858000" cy="9144000"/>
@@ -247,7 +248,7 @@
           <a:p>
             <a:fld id="{F5FDE5C2-B812-4115-92B5-A74E23D2B654}" type="datetimeFigureOut">
               <a:rPr lang="en-US" smtClean="0"/>
-              <a:t>1/6/2016</a:t>
+              <a:t>1/8/2016</a:t>
             </a:fld>
             <a:endParaRPr lang="en-US"/>
           </a:p>
@@ -417,7 +418,7 @@
           <a:p>
             <a:fld id="{F5FDE5C2-B812-4115-92B5-A74E23D2B654}" type="datetimeFigureOut">
               <a:rPr lang="en-US" smtClean="0"/>
-              <a:t>1/6/2016</a:t>
+              <a:t>1/8/2016</a:t>
             </a:fld>
             <a:endParaRPr lang="en-US"/>
           </a:p>
@@ -597,7 +598,7 @@
           <a:p>
             <a:fld id="{F5FDE5C2-B812-4115-92B5-A74E23D2B654}" type="datetimeFigureOut">
               <a:rPr lang="en-US" smtClean="0"/>
-              <a:t>1/6/2016</a:t>
+              <a:t>1/8/2016</a:t>
             </a:fld>
             <a:endParaRPr lang="en-US"/>
           </a:p>
@@ -772,7 +773,7 @@
           <a:p>
             <a:fld id="{F5FDE5C2-B812-4115-92B5-A74E23D2B654}" type="datetimeFigureOut">
               <a:rPr lang="en-US" smtClean="0"/>
-              <a:t>1/6/2016</a:t>
+              <a:t>1/8/2016</a:t>
             </a:fld>
             <a:endParaRPr lang="en-US"/>
           </a:p>
@@ -1018,7 +1019,7 @@
           <a:p>
             <a:fld id="{F5FDE5C2-B812-4115-92B5-A74E23D2B654}" type="datetimeFigureOut">
               <a:rPr lang="en-US" smtClean="0"/>
-              <a:t>1/6/2016</a:t>
+              <a:t>1/8/2016</a:t>
             </a:fld>
             <a:endParaRPr lang="en-US"/>
           </a:p>
@@ -1250,7 +1251,7 @@
           <a:p>
             <a:fld id="{F5FDE5C2-B812-4115-92B5-A74E23D2B654}" type="datetimeFigureOut">
               <a:rPr lang="en-US" smtClean="0"/>
-              <a:t>1/6/2016</a:t>
+              <a:t>1/8/2016</a:t>
             </a:fld>
             <a:endParaRPr lang="en-US"/>
           </a:p>
@@ -1617,7 +1618,7 @@
           <a:p>
             <a:fld id="{F5FDE5C2-B812-4115-92B5-A74E23D2B654}" type="datetimeFigureOut">
               <a:rPr lang="en-US" smtClean="0"/>
-              <a:t>1/6/2016</a:t>
+              <a:t>1/8/2016</a:t>
             </a:fld>
             <a:endParaRPr lang="en-US"/>
           </a:p>
@@ -1735,7 +1736,7 @@
           <a:p>
             <a:fld id="{F5FDE5C2-B812-4115-92B5-A74E23D2B654}" type="datetimeFigureOut">
               <a:rPr lang="en-US" smtClean="0"/>
-              <a:t>1/6/2016</a:t>
+              <a:t>1/8/2016</a:t>
             </a:fld>
             <a:endParaRPr lang="en-US"/>
           </a:p>
@@ -1830,7 +1831,7 @@
           <a:p>
             <a:fld id="{F5FDE5C2-B812-4115-92B5-A74E23D2B654}" type="datetimeFigureOut">
               <a:rPr lang="en-US" smtClean="0"/>
-              <a:t>1/6/2016</a:t>
+              <a:t>1/8/2016</a:t>
             </a:fld>
             <a:endParaRPr lang="en-US"/>
           </a:p>
@@ -2107,7 +2108,7 @@
           <a:p>
             <a:fld id="{F5FDE5C2-B812-4115-92B5-A74E23D2B654}" type="datetimeFigureOut">
               <a:rPr lang="en-US" smtClean="0"/>
-              <a:t>1/6/2016</a:t>
+              <a:t>1/8/2016</a:t>
             </a:fld>
             <a:endParaRPr lang="en-US"/>
           </a:p>
@@ -2364,7 +2365,7 @@
           <a:p>
             <a:fld id="{F5FDE5C2-B812-4115-92B5-A74E23D2B654}" type="datetimeFigureOut">
               <a:rPr lang="en-US" smtClean="0"/>
-              <a:t>1/6/2016</a:t>
+              <a:t>1/8/2016</a:t>
             </a:fld>
             <a:endParaRPr lang="en-US"/>
           </a:p>
@@ -2607,7 +2608,7 @@
           <a:p>
             <a:fld id="{F5FDE5C2-B812-4115-92B5-A74E23D2B654}" type="datetimeFigureOut">
               <a:rPr lang="en-US" smtClean="0"/>
-              <a:t>1/6/2016</a:t>
+              <a:t>1/8/2016</a:t>
             </a:fld>
             <a:endParaRPr lang="en-US"/>
           </a:p>
@@ -3291,13 +3292,13 @@
   <p:clrMapOvr>
     <a:masterClrMapping/>
   </p:clrMapOvr>
-  <mc:AlternateContent xmlns:mc="http://schemas.openxmlformats.org/markup-compatibility/2006">
-    <mc:Choice xmlns:p14="http://schemas.microsoft.com/office/powerpoint/2010/main" Requires="p14">
+  <mc:AlternateContent xmlns:mc="http://schemas.openxmlformats.org/markup-compatibility/2006" xmlns:p14="http://schemas.microsoft.com/office/powerpoint/2010/main">
+    <mc:Choice Requires="p14">
       <p:transition spd="med" p14:dur="700">
         <p:fade/>
       </p:transition>
     </mc:Choice>
-    <mc:Fallback>
+    <mc:Fallback xmlns="">
       <p:transition spd="med">
         <p:fade/>
       </p:transition>
@@ -3395,13 +3396,13 @@
   <p:clrMapOvr>
     <a:masterClrMapping/>
   </p:clrMapOvr>
-  <mc:AlternateContent xmlns:mc="http://schemas.openxmlformats.org/markup-compatibility/2006">
-    <mc:Choice xmlns:p14="http://schemas.microsoft.com/office/powerpoint/2010/main" Requires="p14">
+  <mc:AlternateContent xmlns:mc="http://schemas.openxmlformats.org/markup-compatibility/2006" xmlns:p14="http://schemas.microsoft.com/office/powerpoint/2010/main">
+    <mc:Choice Requires="p14">
       <p:transition spd="med" p14:dur="700">
         <p:fade/>
       </p:transition>
     </mc:Choice>
-    <mc:Fallback>
+    <mc:Fallback xmlns="">
       <p:transition spd="med">
         <p:fade/>
       </p:transition>
@@ -3492,13 +3493,13 @@
   <p:clrMapOvr>
     <a:masterClrMapping/>
   </p:clrMapOvr>
-  <mc:AlternateContent xmlns:mc="http://schemas.openxmlformats.org/markup-compatibility/2006">
-    <mc:Choice xmlns:p14="http://schemas.microsoft.com/office/powerpoint/2010/main" Requires="p14">
+  <mc:AlternateContent xmlns:mc="http://schemas.openxmlformats.org/markup-compatibility/2006" xmlns:p14="http://schemas.microsoft.com/office/powerpoint/2010/main">
+    <mc:Choice Requires="p14">
       <p:transition spd="med" p14:dur="700">
         <p:fade/>
       </p:transition>
     </mc:Choice>
-    <mc:Fallback>
+    <mc:Fallback xmlns="">
       <p:transition spd="med">
         <p:fade/>
       </p:transition>
@@ -3556,9 +3557,9 @@
       </p:sp>
       <p:pic>
         <p:nvPicPr>
-          <p:cNvPr id="4" name="Content Placeholder 3"/>
+          <p:cNvPr id="5" name="Content Placeholder 4"/>
           <p:cNvPicPr>
-            <a:picLocks noGrp="1"/>
+            <a:picLocks noGrp="1" noChangeAspect="1"/>
           </p:cNvPicPr>
           <p:nvPr>
             <p:ph idx="1"/>
@@ -3578,12 +3579,9 @@
         </p:blipFill>
         <p:spPr>
           <a:xfrm>
-            <a:off x="1426296" y="1655762"/>
-            <a:ext cx="9771206" cy="4487461"/>
+            <a:off x="990532" y="1655762"/>
+            <a:ext cx="9992024" cy="4590492"/>
           </a:xfrm>
-          <a:prstGeom prst="rect">
-            <a:avLst/>
-          </a:prstGeom>
         </p:spPr>
       </p:pic>
     </p:spTree>
@@ -3596,13 +3594,13 @@
   <p:clrMapOvr>
     <a:masterClrMapping/>
   </p:clrMapOvr>
-  <mc:AlternateContent xmlns:mc="http://schemas.openxmlformats.org/markup-compatibility/2006">
-    <mc:Choice xmlns:p14="http://schemas.microsoft.com/office/powerpoint/2010/main" Requires="p14">
+  <mc:AlternateContent xmlns:mc="http://schemas.openxmlformats.org/markup-compatibility/2006" xmlns:p14="http://schemas.microsoft.com/office/powerpoint/2010/main">
+    <mc:Choice Requires="p14">
       <p:transition spd="med" p14:dur="700">
         <p:fade/>
       </p:transition>
     </mc:Choice>
-    <mc:Fallback>
+    <mc:Fallback xmlns="">
       <p:transition spd="med">
         <p:fade/>
       </p:transition>
@@ -3635,6 +3633,110 @@
           <a:chExt cx="0" cy="0"/>
         </a:xfrm>
       </p:grpSpPr>
+      <p:sp>
+        <p:nvSpPr>
+          <p:cNvPr id="2" name="Title 1"/>
+          <p:cNvSpPr>
+            <a:spLocks noGrp="1"/>
+          </p:cNvSpPr>
+          <p:nvPr>
+            <p:ph type="title"/>
+          </p:nvPr>
+        </p:nvSpPr>
+        <p:spPr/>
+        <p:txBody>
+          <a:bodyPr/>
+          <a:lstStyle/>
+          <a:p>
+            <a:r>
+              <a:rPr lang="en-US" dirty="0" err="1" smtClean="0"/>
+              <a:t>SlashBurn</a:t>
+            </a:r>
+            <a:endParaRPr lang="en-US" dirty="0"/>
+          </a:p>
+        </p:txBody>
+      </p:sp>
+      <p:pic>
+        <p:nvPicPr>
+          <p:cNvPr id="4" name="Content Placeholder 3"/>
+          <p:cNvPicPr>
+            <a:picLocks noGrp="1"/>
+          </p:cNvPicPr>
+          <p:nvPr>
+            <p:ph idx="1"/>
+          </p:nvPr>
+        </p:nvPicPr>
+        <p:blipFill>
+          <a:blip r:embed="rId2">
+            <a:extLst>
+              <a:ext uri="{28A0092B-C50C-407E-A947-70E740481C1C}">
+                <a14:useLocalDpi xmlns:a14="http://schemas.microsoft.com/office/drawing/2010/main" val="0"/>
+              </a:ext>
+            </a:extLst>
+          </a:blip>
+          <a:stretch>
+            <a:fillRect/>
+          </a:stretch>
+        </p:blipFill>
+        <p:spPr>
+          <a:xfrm>
+            <a:off x="2621024" y="1655762"/>
+            <a:ext cx="7381749" cy="3953813"/>
+          </a:xfrm>
+          <a:prstGeom prst="rect">
+            <a:avLst/>
+          </a:prstGeom>
+        </p:spPr>
+      </p:pic>
+    </p:spTree>
+    <p:extLst>
+      <p:ext uri="{BB962C8B-B14F-4D97-AF65-F5344CB8AC3E}">
+        <p14:creationId xmlns:p14="http://schemas.microsoft.com/office/powerpoint/2010/main" val="3517587840"/>
+      </p:ext>
+    </p:extLst>
+  </p:cSld>
+  <p:clrMapOvr>
+    <a:masterClrMapping/>
+  </p:clrMapOvr>
+  <mc:AlternateContent xmlns:mc="http://schemas.openxmlformats.org/markup-compatibility/2006" xmlns:p14="http://schemas.microsoft.com/office/powerpoint/2010/main">
+    <mc:Choice Requires="p14">
+      <p:transition spd="med" p14:dur="700">
+        <p:fade/>
+      </p:transition>
+    </mc:Choice>
+    <mc:Fallback xmlns="">
+      <p:transition spd="med">
+        <p:fade/>
+      </p:transition>
+    </mc:Fallback>
+  </mc:AlternateContent>
+  <p:timing>
+    <p:tnLst>
+      <p:par>
+        <p:cTn id="1" dur="indefinite" restart="never" nodeType="tmRoot"/>
+      </p:par>
+    </p:tnLst>
+  </p:timing>
+</p:sld>
+</file>
+
+<file path=ppt/slides/slide6.xml><?xml version="1.0" encoding="utf-8"?>
+<p:sld xmlns:a="http://schemas.openxmlformats.org/drawingml/2006/main" xmlns:r="http://schemas.openxmlformats.org/officeDocument/2006/relationships" xmlns:p="http://schemas.openxmlformats.org/presentationml/2006/main">
+  <p:cSld>
+    <p:spTree>
+      <p:nvGrpSpPr>
+        <p:cNvPr id="1" name=""/>
+        <p:cNvGrpSpPr/>
+        <p:nvPr/>
+      </p:nvGrpSpPr>
+      <p:grpSpPr>
+        <a:xfrm>
+          <a:off x="0" y="0"/>
+          <a:ext cx="0" cy="0"/>
+          <a:chOff x="0" y="0"/>
+          <a:chExt cx="0" cy="0"/>
+        </a:xfrm>
+      </p:grpSpPr>
       <p:pic>
         <p:nvPicPr>
           <p:cNvPr id="6" name="Content Placeholder 5"/>
@@ -3702,13 +3804,13 @@
   <p:clrMapOvr>
     <a:masterClrMapping/>
   </p:clrMapOvr>
-  <mc:AlternateContent xmlns:mc="http://schemas.openxmlformats.org/markup-compatibility/2006">
-    <mc:Choice xmlns:p14="http://schemas.microsoft.com/office/powerpoint/2010/main" Requires="p14">
+  <mc:AlternateContent xmlns:mc="http://schemas.openxmlformats.org/markup-compatibility/2006" xmlns:p14="http://schemas.microsoft.com/office/powerpoint/2010/main">
+    <mc:Choice Requires="p14">
       <p:transition spd="med" p14:dur="700">
         <p:fade/>
       </p:transition>
     </mc:Choice>
-    <mc:Fallback>
+    <mc:Fallback xmlns="">
       <p:transition spd="med">
         <p:fade/>
       </p:transition>

</xml_diff>